<commit_message>
update presentation and diagrams
</commit_message>
<xml_diff>
--- a/Bemutato.pptx
+++ b/Bemutato.pptx
@@ -3864,7 +3864,7 @@
             <a:fld id="{B61BEF0D-F0BB-DE4B-95CE-6DB70DBA9567}" type="datetimeFigureOut">
               <a:rPr lang="en-US" dirty="0"/>
               <a:pPr/>
-              <a:t>5/17/2020</a:t>
+              <a:t>5/21/2020</a:t>
             </a:fld>
             <a:endParaRPr lang="en-US" dirty="0"/>
           </a:p>
@@ -4112,7 +4112,7 @@
             <a:fld id="{B61BEF0D-F0BB-DE4B-95CE-6DB70DBA9567}" type="datetimeFigureOut">
               <a:rPr lang="en-US" dirty="0"/>
               <a:pPr/>
-              <a:t>5/17/2020</a:t>
+              <a:t>5/21/2020</a:t>
             </a:fld>
             <a:endParaRPr lang="en-US" dirty="0"/>
           </a:p>
@@ -4423,7 +4423,7 @@
             <a:fld id="{B61BEF0D-F0BB-DE4B-95CE-6DB70DBA9567}" type="datetimeFigureOut">
               <a:rPr lang="en-US" dirty="0"/>
               <a:pPr/>
-              <a:t>5/17/2020</a:t>
+              <a:t>5/21/2020</a:t>
             </a:fld>
             <a:endParaRPr lang="en-US" dirty="0"/>
           </a:p>
@@ -4761,7 +4761,7 @@
             <a:fld id="{B61BEF0D-F0BB-DE4B-95CE-6DB70DBA9567}" type="datetimeFigureOut">
               <a:rPr lang="en-US" dirty="0"/>
               <a:pPr/>
-              <a:t>5/17/2020</a:t>
+              <a:t>5/21/2020</a:t>
             </a:fld>
             <a:endParaRPr lang="en-US" dirty="0"/>
           </a:p>
@@ -5072,7 +5072,7 @@
             <a:fld id="{B61BEF0D-F0BB-DE4B-95CE-6DB70DBA9567}" type="datetimeFigureOut">
               <a:rPr lang="en-US" dirty="0"/>
               <a:pPr/>
-              <a:t>5/17/2020</a:t>
+              <a:t>5/21/2020</a:t>
             </a:fld>
             <a:endParaRPr lang="en-US" dirty="0"/>
           </a:p>
@@ -5462,7 +5462,7 @@
             <a:fld id="{B61BEF0D-F0BB-DE4B-95CE-6DB70DBA9567}" type="datetimeFigureOut">
               <a:rPr lang="en-US" dirty="0"/>
               <a:pPr/>
-              <a:t>5/17/2020</a:t>
+              <a:t>5/21/2020</a:t>
             </a:fld>
             <a:endParaRPr lang="en-US" dirty="0"/>
           </a:p>
@@ -5628,7 +5628,7 @@
           <a:p>
             <a:fld id="{55C6B4A9-1611-4792-9094-5F34BCA07E0B}" type="datetimeFigureOut">
               <a:rPr lang="en-US" dirty="0"/>
-              <a:t>5/17/2020</a:t>
+              <a:t>5/21/2020</a:t>
             </a:fld>
             <a:endParaRPr lang="en-US" dirty="0"/>
           </a:p>
@@ -5804,7 +5804,7 @@
             <a:fld id="{B61BEF0D-F0BB-DE4B-95CE-6DB70DBA9567}" type="datetimeFigureOut">
               <a:rPr lang="en-US" dirty="0"/>
               <a:pPr/>
-              <a:t>5/17/2020</a:t>
+              <a:t>5/21/2020</a:t>
             </a:fld>
             <a:endParaRPr lang="en-US" dirty="0"/>
           </a:p>
@@ -5977,7 +5977,7 @@
             <a:fld id="{B61BEF0D-F0BB-DE4B-95CE-6DB70DBA9567}" type="datetimeFigureOut">
               <a:rPr lang="en-US" dirty="0"/>
               <a:pPr/>
-              <a:t>5/17/2020</a:t>
+              <a:t>5/21/2020</a:t>
             </a:fld>
             <a:endParaRPr lang="en-US" dirty="0"/>
           </a:p>
@@ -6221,7 +6221,7 @@
             <a:fld id="{B61BEF0D-F0BB-DE4B-95CE-6DB70DBA9567}" type="datetimeFigureOut">
               <a:rPr lang="en-US" dirty="0"/>
               <a:pPr/>
-              <a:t>5/17/2020</a:t>
+              <a:t>5/21/2020</a:t>
             </a:fld>
             <a:endParaRPr lang="en-US" dirty="0"/>
           </a:p>
@@ -6449,7 +6449,7 @@
           <a:p>
             <a:fld id="{EB712588-04B1-427B-82EE-E8DB90309F08}" type="datetimeFigureOut">
               <a:rPr lang="en-US" dirty="0"/>
-              <a:t>5/17/2020</a:t>
+              <a:t>5/21/2020</a:t>
             </a:fld>
             <a:endParaRPr lang="en-US" dirty="0"/>
           </a:p>
@@ -6819,7 +6819,7 @@
             <a:fld id="{B61BEF0D-F0BB-DE4B-95CE-6DB70DBA9567}" type="datetimeFigureOut">
               <a:rPr lang="en-US" dirty="0"/>
               <a:pPr/>
-              <a:t>5/17/2020</a:t>
+              <a:t>5/21/2020</a:t>
             </a:fld>
             <a:endParaRPr lang="en-US" dirty="0"/>
           </a:p>
@@ -6939,7 +6939,7 @@
             <a:fld id="{B61BEF0D-F0BB-DE4B-95CE-6DB70DBA9567}" type="datetimeFigureOut">
               <a:rPr lang="en-US" dirty="0"/>
               <a:pPr/>
-              <a:t>5/17/2020</a:t>
+              <a:t>5/21/2020</a:t>
             </a:fld>
             <a:endParaRPr lang="en-US" dirty="0"/>
           </a:p>
@@ -7031,7 +7031,7 @@
             <a:fld id="{B61BEF0D-F0BB-DE4B-95CE-6DB70DBA9567}" type="datetimeFigureOut">
               <a:rPr lang="en-US" dirty="0"/>
               <a:pPr/>
-              <a:t>5/17/2020</a:t>
+              <a:t>5/21/2020</a:t>
             </a:fld>
             <a:endParaRPr lang="en-US" dirty="0"/>
           </a:p>
@@ -7282,7 +7282,7 @@
           <a:p>
             <a:fld id="{42A54C80-263E-416B-A8E0-580EDEADCBDC}" type="datetimeFigureOut">
               <a:rPr lang="en-US" dirty="0"/>
-              <a:t>5/17/2020</a:t>
+              <a:t>5/21/2020</a:t>
             </a:fld>
             <a:endParaRPr lang="en-US" dirty="0"/>
           </a:p>
@@ -7541,7 +7541,7 @@
             <a:fld id="{B61BEF0D-F0BB-DE4B-95CE-6DB70DBA9567}" type="datetimeFigureOut">
               <a:rPr lang="en-US" dirty="0"/>
               <a:pPr/>
-              <a:t>5/17/2020</a:t>
+              <a:t>5/21/2020</a:t>
             </a:fld>
             <a:endParaRPr lang="en-US" dirty="0"/>
           </a:p>
@@ -8281,7 +8281,7 @@
             <a:fld id="{B61BEF0D-F0BB-DE4B-95CE-6DB70DBA9567}" type="datetimeFigureOut">
               <a:rPr lang="en-US" dirty="0"/>
               <a:pPr/>
-              <a:t>5/17/2020</a:t>
+              <a:t>5/21/2020</a:t>
             </a:fld>
             <a:endParaRPr lang="en-US" dirty="0"/>
           </a:p>
@@ -11403,13 +11403,8 @@
           <a:p>
             <a:r>
               <a:rPr lang="hu-HU" dirty="0"/>
-              <a:t>Kiválasztott </a:t>
+              <a:t>Kiválasztott Technológia</a:t>
             </a:r>
-            <a:r>
-              <a:rPr lang="hu-HU" dirty="0" err="1"/>
-              <a:t>Technológa</a:t>
-            </a:r>
-            <a:endParaRPr lang="hu-HU" dirty="0"/>
           </a:p>
         </p:txBody>
       </p:sp>
@@ -11530,41 +11525,32 @@
       </p:sp>
       <p:pic>
         <p:nvPicPr>
-          <p:cNvPr id="4" name="Kép 3">
+          <p:cNvPr id="6" name="Kép 5" descr="A képen képernyőkép látható&#10;&#10;Automatikusan generált leírás">
             <a:extLst>
               <a:ext uri="{FF2B5EF4-FFF2-40B4-BE49-F238E27FC236}">
-                <a16:creationId xmlns:a16="http://schemas.microsoft.com/office/drawing/2014/main" id="{14BEFBC1-2734-44F8-83FF-2BF3116FFDE2}"/>
+                <a16:creationId xmlns:a16="http://schemas.microsoft.com/office/drawing/2014/main" id="{CB79D8E8-1C0D-4FE0-B784-FD086223B9F9}"/>
               </a:ext>
             </a:extLst>
           </p:cNvPr>
-          <p:cNvPicPr/>
+          <p:cNvPicPr>
+            <a:picLocks noChangeAspect="1"/>
+          </p:cNvPicPr>
           <p:nvPr/>
         </p:nvPicPr>
         <p:blipFill>
-          <a:blip r:embed="rId2">
-            <a:extLst>
-              <a:ext uri="{28A0092B-C50C-407E-A947-70E740481C1C}">
-                <a14:useLocalDpi xmlns:a14="http://schemas.microsoft.com/office/drawing/2010/main" val="0"/>
-              </a:ext>
-            </a:extLst>
-          </a:blip>
-          <a:srcRect/>
+          <a:blip r:embed="rId2"/>
           <a:stretch>
             <a:fillRect/>
           </a:stretch>
         </p:blipFill>
-        <p:spPr bwMode="auto">
+        <p:spPr>
           <a:xfrm>
-            <a:off x="2236595" y="5041610"/>
-            <a:ext cx="5478145" cy="1628775"/>
+            <a:off x="5768953" y="3062822"/>
+            <a:ext cx="6311287" cy="2365212"/>
           </a:xfrm>
           <a:prstGeom prst="rect">
             <a:avLst/>
           </a:prstGeom>
-          <a:noFill/>
-          <a:ln>
-            <a:noFill/>
-          </a:ln>
         </p:spPr>
       </p:pic>
     </p:spTree>

</xml_diff>